<commit_message>
Added links to Unity deck
</commit_message>
<xml_diff>
--- a/Unity and .NET/Awesome games with .NET, Visual Studio 2019 and Unity 2019.pptx
+++ b/Unity and .NET/Awesome games with .NET, Visual Studio 2019 and Unity 2019.pptx
@@ -152,6 +152,9 @@
     <p:ext uri="{EFAFB233-063F-42B5-8137-9DF3F51BA10A}">
       <p15:sldGuideLst xmlns:p15="http://schemas.microsoft.com/office/powerpoint/2012/main"/>
     </p:ext>
+    <p:ext uri="{2D200454-40CA-4A62-9FC3-DE9A4176ACB9}">
+      <p15:notesGuideLst xmlns:p15="http://schemas.microsoft.com/office/powerpoint/2012/main"/>
+    </p:ext>
   </p:extLst>
 </p:presentation>
 </file>
@@ -246,7 +249,7 @@
           <a:p>
             <a:fld id="{18438622-0837-4E9E-A16C-0B0206CE676E}" type="datetimeFigureOut">
               <a:rPr lang="en-US" smtClean="0"/>
-              <a:t>10/29/2019</a:t>
+              <a:t>10/30/2019</a:t>
             </a:fld>
             <a:endParaRPr lang="en-US"/>
           </a:p>
@@ -10092,8 +10095,8 @@
         </p:nvSpPr>
         <p:spPr>
           <a:xfrm>
-            <a:off x="773723" y="1699846"/>
-            <a:ext cx="10023231" cy="4158061"/>
+            <a:off x="773723" y="1113106"/>
+            <a:ext cx="10374337" cy="4595104"/>
           </a:xfrm>
           <a:prstGeom prst="rect">
             <a:avLst/>
@@ -10190,7 +10193,7 @@
                   </a:schemeClr>
                 </a:solidFill>
               </a:rPr>
-              <a:t>Learning course on scripting with Unity and Visual Studio</a:t>
+              <a:t>unity Learn</a:t>
             </a:r>
           </a:p>
           <a:p>
@@ -10203,12 +10206,32 @@
               </a:spcAft>
             </a:pPr>
             <a:r>
-              <a:rPr lang="en-US" sz="3000" dirty="0">
+              <a:rPr lang="en-US" sz="2800" dirty="0">
                 <a:hlinkClick r:id="rId4"/>
               </a:rPr>
-              <a:t>https://aka.ms/learn-unity</a:t>
-            </a:r>
-            <a:endParaRPr lang="en-US" sz="3000" dirty="0"/>
+              <a:t>https://learn.unity.com</a:t>
+            </a:r>
+            <a:r>
+              <a:rPr lang="en-US" sz="2800" dirty="0"/>
+              <a:t> </a:t>
+            </a:r>
+          </a:p>
+          <a:p>
+            <a:pPr>
+              <a:lnSpc>
+                <a:spcPct val="90000"/>
+              </a:lnSpc>
+              <a:spcAft>
+                <a:spcPts val="600"/>
+              </a:spcAft>
+            </a:pPr>
+            <a:r>
+              <a:rPr lang="en-US" sz="2800" dirty="0">
+                <a:hlinkClick r:id="rId5"/>
+              </a:rPr>
+              <a:t>https://learn.unity.com/tutorial/2d-game-kit-walkthrough/</a:t>
+            </a:r>
+            <a:endParaRPr lang="en-US" sz="2800" dirty="0"/>
           </a:p>
           <a:p>
             <a:pPr>
@@ -10263,7 +10286,7 @@
                     <a:lumMod val="85000"/>
                   </a:schemeClr>
                 </a:solidFill>
-                <a:hlinkClick r:id="rId5"/>
+                <a:hlinkClick r:id="rId6"/>
               </a:rPr>
               <a:t>https://aka.ms/first-unity-game</a:t>
             </a:r>

</xml_diff>